<commit_message>
Undo Dragram Starting State: Rename to TaskManager
</commit_message>
<xml_diff>
--- a/docs/diagrams/UndoRedoStartingStateListDiagram.pptx
+++ b/docs/diagrams/UndoRedoStartingStateListDiagram.pptx
@@ -245,7 +245,7 @@
           <a:p>
             <a:fld id="{8B2F8DF3-7CFE-4C7E-A62E-FD00A81FB0CD}" type="datetimeFigureOut">
               <a:rPr lang="en-US" smtClean="0"/>
-              <a:t>7/6/2018</a:t>
+              <a:t>10/18/18</a:t>
             </a:fld>
             <a:endParaRPr lang="en-US"/>
           </a:p>
@@ -413,7 +413,7 @@
           <a:p>
             <a:fld id="{8B2F8DF3-7CFE-4C7E-A62E-FD00A81FB0CD}" type="datetimeFigureOut">
               <a:rPr lang="en-US" smtClean="0"/>
-              <a:t>7/6/2018</a:t>
+              <a:t>10/18/18</a:t>
             </a:fld>
             <a:endParaRPr lang="en-US"/>
           </a:p>
@@ -591,7 +591,7 @@
           <a:p>
             <a:fld id="{8B2F8DF3-7CFE-4C7E-A62E-FD00A81FB0CD}" type="datetimeFigureOut">
               <a:rPr lang="en-US" smtClean="0"/>
-              <a:t>7/6/2018</a:t>
+              <a:t>10/18/18</a:t>
             </a:fld>
             <a:endParaRPr lang="en-US"/>
           </a:p>
@@ -759,7 +759,7 @@
           <a:p>
             <a:fld id="{8B2F8DF3-7CFE-4C7E-A62E-FD00A81FB0CD}" type="datetimeFigureOut">
               <a:rPr lang="en-US" smtClean="0"/>
-              <a:t>7/6/2018</a:t>
+              <a:t>10/18/18</a:t>
             </a:fld>
             <a:endParaRPr lang="en-US"/>
           </a:p>
@@ -1004,7 +1004,7 @@
           <a:p>
             <a:fld id="{8B2F8DF3-7CFE-4C7E-A62E-FD00A81FB0CD}" type="datetimeFigureOut">
               <a:rPr lang="en-US" smtClean="0"/>
-              <a:t>7/6/2018</a:t>
+              <a:t>10/18/18</a:t>
             </a:fld>
             <a:endParaRPr lang="en-US"/>
           </a:p>
@@ -1233,7 +1233,7 @@
           <a:p>
             <a:fld id="{8B2F8DF3-7CFE-4C7E-A62E-FD00A81FB0CD}" type="datetimeFigureOut">
               <a:rPr lang="en-US" smtClean="0"/>
-              <a:t>7/6/2018</a:t>
+              <a:t>10/18/18</a:t>
             </a:fld>
             <a:endParaRPr lang="en-US"/>
           </a:p>
@@ -1597,7 +1597,7 @@
           <a:p>
             <a:fld id="{8B2F8DF3-7CFE-4C7E-A62E-FD00A81FB0CD}" type="datetimeFigureOut">
               <a:rPr lang="en-US" smtClean="0"/>
-              <a:t>7/6/2018</a:t>
+              <a:t>10/18/18</a:t>
             </a:fld>
             <a:endParaRPr lang="en-US"/>
           </a:p>
@@ -1714,7 +1714,7 @@
           <a:p>
             <a:fld id="{8B2F8DF3-7CFE-4C7E-A62E-FD00A81FB0CD}" type="datetimeFigureOut">
               <a:rPr lang="en-US" smtClean="0"/>
-              <a:t>7/6/2018</a:t>
+              <a:t>10/18/18</a:t>
             </a:fld>
             <a:endParaRPr lang="en-US"/>
           </a:p>
@@ -1809,7 +1809,7 @@
           <a:p>
             <a:fld id="{8B2F8DF3-7CFE-4C7E-A62E-FD00A81FB0CD}" type="datetimeFigureOut">
               <a:rPr lang="en-US" smtClean="0"/>
-              <a:t>7/6/2018</a:t>
+              <a:t>10/18/18</a:t>
             </a:fld>
             <a:endParaRPr lang="en-US"/>
           </a:p>
@@ -2084,7 +2084,7 @@
           <a:p>
             <a:fld id="{8B2F8DF3-7CFE-4C7E-A62E-FD00A81FB0CD}" type="datetimeFigureOut">
               <a:rPr lang="en-US" smtClean="0"/>
-              <a:t>7/6/2018</a:t>
+              <a:t>10/18/18</a:t>
             </a:fld>
             <a:endParaRPr lang="en-US"/>
           </a:p>
@@ -2336,7 +2336,7 @@
           <a:p>
             <a:fld id="{8B2F8DF3-7CFE-4C7E-A62E-FD00A81FB0CD}" type="datetimeFigureOut">
               <a:rPr lang="en-US" smtClean="0"/>
-              <a:t>7/6/2018</a:t>
+              <a:t>10/18/18</a:t>
             </a:fld>
             <a:endParaRPr lang="en-US"/>
           </a:p>
@@ -2547,7 +2547,7 @@
           <a:p>
             <a:fld id="{8B2F8DF3-7CFE-4C7E-A62E-FD00A81FB0CD}" type="datetimeFigureOut">
               <a:rPr lang="en-US" smtClean="0"/>
-              <a:t>7/6/2018</a:t>
+              <a:t>10/18/18</a:t>
             </a:fld>
             <a:endParaRPr lang="en-US"/>
           </a:p>
@@ -2957,7 +2957,7 @@
           <p:cNvPr id="4" name="TextBox 3">
             <a:extLst>
               <a:ext uri="{FF2B5EF4-FFF2-40B4-BE49-F238E27FC236}">
-                <a16:creationId xmlns:a16="http://schemas.microsoft.com/office/drawing/2014/main" id="{3151A13B-9509-43FA-BFEB-1D9866A00B84}"/>
+                <a16:creationId xmlns:a16="http://schemas.microsoft.com/office/drawing/2014/main" xmlns="" id="{3151A13B-9509-43FA-BFEB-1D9866A00B84}"/>
               </a:ext>
             </a:extLst>
           </p:cNvPr>
@@ -3001,7 +3001,7 @@
           <p:cNvPr id="5" name="Table 4">
             <a:extLst>
               <a:ext uri="{FF2B5EF4-FFF2-40B4-BE49-F238E27FC236}">
-                <a16:creationId xmlns:a16="http://schemas.microsoft.com/office/drawing/2014/main" id="{F545FAB8-F1CE-4886-9BDE-E772BCB0A9C4}"/>
+                <a16:creationId xmlns:a16="http://schemas.microsoft.com/office/drawing/2014/main" xmlns="" id="{F545FAB8-F1CE-4886-9BDE-E772BCB0A9C4}"/>
               </a:ext>
             </a:extLst>
           </p:cNvPr>
@@ -3011,14 +3011,14 @@
           <p:nvPr>
             <p:extLst>
               <p:ext uri="{D42A27DB-BD31-4B8C-83A1-F6EECF244321}">
-                <p14:modId xmlns:p14="http://schemas.microsoft.com/office/powerpoint/2010/main" val="1292556626"/>
+                <p14:modId xmlns:p14="http://schemas.microsoft.com/office/powerpoint/2010/main" val="1223557426"/>
               </p:ext>
             </p:extLst>
           </p:nvPr>
         </p:nvGraphicFramePr>
         <p:xfrm>
-          <a:off x="637997" y="2769442"/>
-          <a:ext cx="1833356" cy="410363"/>
+          <a:off x="637996" y="2769442"/>
+          <a:ext cx="2052651" cy="410363"/>
         </p:xfrm>
         <a:graphic>
           <a:graphicData uri="http://schemas.openxmlformats.org/drawingml/2006/table">
@@ -3027,10 +3027,10 @@
                 <a:tableStyleId>{638B1855-1B75-4FBE-930C-398BA8C253C6}</a:tableStyleId>
               </a:tblPr>
               <a:tblGrid>
-                <a:gridCol w="1833356">
+                <a:gridCol w="2052651">
                   <a:extLst>
                     <a:ext uri="{9D8B030D-6E8A-4147-A177-3AD203B41FA5}">
-                      <a16:colId xmlns:a16="http://schemas.microsoft.com/office/drawing/2014/main" val="4240773277"/>
+                      <a16:colId xmlns:a16="http://schemas.microsoft.com/office/drawing/2014/main" xmlns="" val="4240773277"/>
                     </a:ext>
                   </a:extLst>
                 </a:gridCol>
@@ -3041,22 +3041,54 @@
                     <a:bodyPr/>
                     <a:lstStyle/>
                     <a:p>
+                      <a:pPr marL="0" marR="0" indent="0" algn="l" defTabSz="914400" rtl="0" eaLnBrk="1" fontAlgn="auto" latinLnBrk="0" hangingPunct="1">
+                        <a:lnSpc>
+                          <a:spcPct val="100000"/>
+                        </a:lnSpc>
+                        <a:spcBef>
+                          <a:spcPts val="0"/>
+                        </a:spcBef>
+                        <a:spcAft>
+                          <a:spcPts val="0"/>
+                        </a:spcAft>
+                        <a:buClrTx/>
+                        <a:buSzTx/>
+                        <a:buFontTx/>
+                        <a:buNone/>
+                        <a:tabLst/>
+                        <a:defRPr/>
+                      </a:pPr>
                       <a:r>
-                        <a:rPr lang="en-SG" u="sng" dirty="0"/>
-                        <a:t>ab0:</a:t>
+                        <a:rPr lang="en-US" sz="1800" u="sng" kern="1200" dirty="0" smtClean="0">
+                          <a:solidFill>
+                            <a:schemeClr val="lt1"/>
+                          </a:solidFill>
+                          <a:effectLst/>
+                          <a:latin typeface="+mn-lt"/>
+                          <a:ea typeface="+mn-ea"/>
+                          <a:cs typeface="+mn-cs"/>
+                        </a:rPr>
+                        <a:t>tm0:TaskManager</a:t>
                       </a:r>
                       <a:r>
-                        <a:rPr lang="en-SG" sz="1800" u="sng" dirty="0"/>
-                        <a:t>AddressBook</a:t>
+                        <a:rPr lang="en-US" sz="1800" kern="1200" dirty="0" smtClean="0">
+                          <a:solidFill>
+                            <a:schemeClr val="lt1"/>
+                          </a:solidFill>
+                          <a:effectLst/>
+                          <a:latin typeface="+mn-lt"/>
+                          <a:ea typeface="+mn-ea"/>
+                          <a:cs typeface="+mn-cs"/>
+                        </a:rPr>
+                        <a:t> </a:t>
                       </a:r>
-                      <a:endParaRPr lang="en-SG" sz="1600" u="sng" dirty="0"/>
                     </a:p>
                   </a:txBody>
                   <a:tcPr/>
                 </a:tc>
                 <a:extLst>
                   <a:ext uri="{0D108BD9-81ED-4DB2-BD59-A6C34878D82A}">
-                    <a16:rowId xmlns:a16="http://schemas.microsoft.com/office/drawing/2014/main" val="2194462629"/>
+                    <a16:rowId xmlns:a16="http://schemas.microsoft.com/office/drawing/2014/main" xmlns="" val="2194462629"/>
                   </a:ext>
                 </a:extLst>
               </a:tr>
@@ -3115,7 +3147,7 @@
           <p:cNvPr id="3" name="Straight Arrow Connector 2">
             <a:extLst>
               <a:ext uri="{FF2B5EF4-FFF2-40B4-BE49-F238E27FC236}">
-                <a16:creationId xmlns:a16="http://schemas.microsoft.com/office/drawing/2014/main" id="{19F1196F-B136-4E44-A8A5-68CAEED3CD2E}"/>
+                <a16:creationId xmlns:a16="http://schemas.microsoft.com/office/drawing/2014/main" xmlns="" id="{19F1196F-B136-4E44-A8A5-68CAEED3CD2E}"/>
               </a:ext>
             </a:extLst>
           </p:cNvPr>

</xml_diff>